<commit_message>
Adding plots in EDA
</commit_message>
<xml_diff>
--- a/Alec_Schneider_Project 2.pptx
+++ b/Alec_Schneider_Project 2.pptx
@@ -108,6 +108,11 @@
       </a:defRPr>
     </a:lvl9pPr>
   </p:defaultTextStyle>
+  <p:extLst>
+    <p:ext uri="{EFAFB233-063F-42B5-8137-9DF3F51BA10A}">
+      <p15:sldGuideLst xmlns:p15="http://schemas.microsoft.com/office/powerpoint/2012/main"/>
+    </p:ext>
+  </p:extLst>
 </p:presentation>
 </file>
 
@@ -279,7 +284,7 @@
           <a:p>
             <a:fld id="{114ACC8B-FBB1-4480-AB9F-197C18AB2855}" type="datetime1">
               <a:rPr lang="en-US" smtClean="0"/>
-              <a:t>11/13/2020</a:t>
+              <a:t>11/14/2020</a:t>
             </a:fld>
             <a:endParaRPr lang="en-US"/>
           </a:p>
@@ -507,7 +512,7 @@
           <a:p>
             <a:fld id="{0D7725AA-B66A-41DC-9162-5EB89763CBA0}" type="datetime1">
               <a:rPr lang="en-US" smtClean="0"/>
-              <a:t>11/13/2020</a:t>
+              <a:t>11/14/2020</a:t>
             </a:fld>
             <a:endParaRPr lang="en-US"/>
           </a:p>
@@ -687,7 +692,7 @@
           <a:p>
             <a:fld id="{39BB1234-147E-493A-9356-6870848F3918}" type="datetime1">
               <a:rPr lang="en-US" smtClean="0"/>
-              <a:t>11/13/2020</a:t>
+              <a:t>11/14/2020</a:t>
             </a:fld>
             <a:endParaRPr lang="en-US"/>
           </a:p>
@@ -857,7 +862,7 @@
           <a:p>
             <a:fld id="{5ACBCA9F-41DC-4169-97F6-7B2690FF2165}" type="datetime1">
               <a:rPr lang="en-US" smtClean="0"/>
-              <a:t>11/13/2020</a:t>
+              <a:t>11/14/2020</a:t>
             </a:fld>
             <a:endParaRPr lang="en-US"/>
           </a:p>
@@ -1111,7 +1116,7 @@
           <a:p>
             <a:fld id="{7D5A4D84-DC92-42CE-B0D5-86B35B61630E}" type="datetime1">
               <a:rPr lang="en-US" smtClean="0"/>
-              <a:t>11/13/2020</a:t>
+              <a:t>11/14/2020</a:t>
             </a:fld>
             <a:endParaRPr lang="en-US"/>
           </a:p>
@@ -1437,7 +1442,7 @@
           <a:p>
             <a:fld id="{76B1EF4E-E00F-4C31-BCE3-3DCE08B8E990}" type="datetime1">
               <a:rPr lang="en-US" smtClean="0"/>
-              <a:t>11/13/2020</a:t>
+              <a:t>11/14/2020</a:t>
             </a:fld>
             <a:endParaRPr lang="en-US"/>
           </a:p>
@@ -1888,7 +1893,7 @@
           <a:p>
             <a:fld id="{FF9C4FCA-8084-4C87-BB06-F14018F39C14}" type="datetime1">
               <a:rPr lang="en-US" smtClean="0"/>
-              <a:t>11/13/2020</a:t>
+              <a:t>11/14/2020</a:t>
             </a:fld>
             <a:endParaRPr lang="en-US"/>
           </a:p>
@@ -2006,7 +2011,7 @@
           <a:p>
             <a:fld id="{9E2C6853-A366-4430-B1A2-AF4D7472F631}" type="datetime1">
               <a:rPr lang="en-US" smtClean="0"/>
-              <a:t>11/13/2020</a:t>
+              <a:t>11/14/2020</a:t>
             </a:fld>
             <a:endParaRPr lang="en-US"/>
           </a:p>
@@ -2101,7 +2106,7 @@
           <a:p>
             <a:fld id="{A4F20404-375D-4C19-A088-8BE7E64A3CAC}" type="datetime1">
               <a:rPr lang="en-US" smtClean="0"/>
-              <a:t>11/13/2020</a:t>
+              <a:t>11/14/2020</a:t>
             </a:fld>
             <a:endParaRPr lang="en-US"/>
           </a:p>
@@ -2388,7 +2393,7 @@
           <a:p>
             <a:fld id="{AF0B22E8-E871-4A31-BA96-F72588C22763}" type="datetime1">
               <a:rPr lang="en-US" smtClean="0"/>
-              <a:t>11/13/2020</a:t>
+              <a:t>11/14/2020</a:t>
             </a:fld>
             <a:endParaRPr lang="en-US"/>
           </a:p>
@@ -2710,7 +2715,7 @@
           <a:p>
             <a:fld id="{F578B820-8308-48D2-B150-F5EBD63D1D29}" type="datetime1">
               <a:rPr lang="en-US" smtClean="0"/>
-              <a:t>11/13/2020</a:t>
+              <a:t>11/14/2020</a:t>
             </a:fld>
             <a:endParaRPr lang="en-US"/>
           </a:p>
@@ -2964,7 +2969,7 @@
           <a:p>
             <a:fld id="{2C55B290-2D3E-40FD-A731-FD561C401CBD}" type="datetime1">
               <a:rPr lang="en-US" smtClean="0"/>
-              <a:t>11/13/2020</a:t>
+              <a:t>11/14/2020</a:t>
             </a:fld>
             <a:endParaRPr lang="en-US"/>
           </a:p>
@@ -3709,6 +3714,13 @@
             <a:pPr lvl="1"/>
             <a:r>
               <a:rPr lang="en-US" dirty="0"/>
+              <a:t>Explored distributions of variables</a:t>
+            </a:r>
+          </a:p>
+          <a:p>
+            <a:pPr lvl="1"/>
+            <a:r>
+              <a:rPr lang="en-US" dirty="0"/>
               <a:t>Explored the relationships between variables</a:t>
             </a:r>
           </a:p>
@@ -4168,7 +4180,7 @@
             <a:pPr lvl="1"/>
             <a:r>
               <a:rPr lang="en-US" dirty="0"/>
-              <a:t>Note taking and comments within the code are</a:t>
+              <a:t>Note taking and comments within the code are detailed and informative</a:t>
             </a:r>
           </a:p>
           <a:p>
@@ -4181,7 +4193,7 @@
             <a:pPr lvl="1"/>
             <a:r>
               <a:rPr lang="en-US" dirty="0"/>
-              <a:t>Individual work is leading to stale ideas and lack or constructive feedback on ideas</a:t>
+              <a:t>Individual work is leading to lack of constructive feedback on ideas</a:t>
             </a:r>
           </a:p>
           <a:p>
@@ -4500,31 +4512,41 @@
           </a:p>
         </p:txBody>
       </p:sp>
-      <p:sp>
-        <p:nvSpPr>
-          <p:cNvPr id="3" name="Content Placeholder 2">
+      <p:pic>
+        <p:nvPicPr>
+          <p:cNvPr id="6" name="Content Placeholder 5" descr="A picture containing graphical user interface&#10;&#10;Description automatically generated">
             <a:extLst>
               <a:ext uri="{FF2B5EF4-FFF2-40B4-BE49-F238E27FC236}">
-                <a16:creationId xmlns:a16="http://schemas.microsoft.com/office/drawing/2014/main" id="{431704F4-B19B-4882-B278-E83E18FE6E82}"/>
+                <a16:creationId xmlns:a16="http://schemas.microsoft.com/office/drawing/2014/main" id="{B423ADDB-24E3-4503-85EA-4AC0D72E3741}"/>
               </a:ext>
             </a:extLst>
           </p:cNvPr>
-          <p:cNvSpPr>
-            <a:spLocks noGrp="1"/>
-          </p:cNvSpPr>
+          <p:cNvPicPr>
+            <a:picLocks noGrp="1" noChangeAspect="1"/>
+          </p:cNvPicPr>
           <p:nvPr>
             <p:ph idx="1"/>
           </p:nvPr>
-        </p:nvSpPr>
-        <p:spPr/>
-        <p:txBody>
-          <a:bodyPr/>
-          <a:lstStyle/>
-          <a:p>
-            <a:endParaRPr lang="en-US" dirty="0"/>
-          </a:p>
-        </p:txBody>
-      </p:sp>
+        </p:nvPicPr>
+        <p:blipFill>
+          <a:blip r:embed="rId2">
+            <a:extLst>
+              <a:ext uri="{28A0092B-C50C-407E-A947-70E740481C1C}">
+                <a14:useLocalDpi xmlns:a14="http://schemas.microsoft.com/office/drawing/2010/main" val="0"/>
+              </a:ext>
+            </a:extLst>
+          </a:blip>
+          <a:stretch>
+            <a:fillRect/>
+          </a:stretch>
+        </p:blipFill>
+        <p:spPr>
+          <a:xfrm>
+            <a:off x="218113" y="1697700"/>
+            <a:ext cx="8212822" cy="5160300"/>
+          </a:xfrm>
+        </p:spPr>
+      </p:pic>
       <p:sp>
         <p:nvSpPr>
           <p:cNvPr id="4" name="Slide Number Placeholder 3">
@@ -4543,7 +4565,9 @@
         </p:nvSpPr>
         <p:spPr/>
         <p:txBody>
-          <a:bodyPr/>
+          <a:bodyPr>
+            <a:normAutofit lnSpcReduction="10000"/>
+          </a:bodyPr>
           <a:lstStyle/>
           <a:p>
             <a:fld id="{105591DE-F0ED-4EB4-8B26-F5B2659E896E}" type="slidenum">
@@ -4551,6 +4575,41 @@
               <a:t>4</a:t>
             </a:fld>
             <a:endParaRPr lang="en-US"/>
+          </a:p>
+        </p:txBody>
+      </p:sp>
+      <p:sp>
+        <p:nvSpPr>
+          <p:cNvPr id="7" name="TextBox 6">
+            <a:extLst>
+              <a:ext uri="{FF2B5EF4-FFF2-40B4-BE49-F238E27FC236}">
+                <a16:creationId xmlns:a16="http://schemas.microsoft.com/office/drawing/2014/main" id="{823C0C28-D225-4053-9F14-9109332361CB}"/>
+              </a:ext>
+            </a:extLst>
+          </p:cNvPr>
+          <p:cNvSpPr txBox="1"/>
+          <p:nvPr/>
+        </p:nvSpPr>
+        <p:spPr>
+          <a:xfrm>
+            <a:off x="9018165" y="2139193"/>
+            <a:ext cx="1669409" cy="1246495"/>
+          </a:xfrm>
+          <a:prstGeom prst="rect">
+            <a:avLst/>
+          </a:prstGeom>
+          <a:noFill/>
+        </p:spPr>
+        <p:txBody>
+          <a:bodyPr wrap="square" rtlCol="0">
+            <a:spAutoFit/>
+          </a:bodyPr>
+          <a:lstStyle/>
+          <a:p>
+            <a:r>
+              <a:rPr lang="en-US" sz="1500" dirty="0"/>
+              <a:t>No strong correlations with our y variable, Satisfaction</a:t>
+            </a:r>
           </a:p>
         </p:txBody>
       </p:sp>
@@ -4713,6 +4772,78 @@
           </a:prstGeom>
         </p:spPr>
       </p:pic>
+      <p:sp>
+        <p:nvSpPr>
+          <p:cNvPr id="3" name="TextBox 2">
+            <a:extLst>
+              <a:ext uri="{FF2B5EF4-FFF2-40B4-BE49-F238E27FC236}">
+                <a16:creationId xmlns:a16="http://schemas.microsoft.com/office/drawing/2014/main" id="{DD509A7B-82B2-4782-914A-FC5C5B601B63}"/>
+              </a:ext>
+            </a:extLst>
+          </p:cNvPr>
+          <p:cNvSpPr txBox="1"/>
+          <p:nvPr/>
+        </p:nvSpPr>
+        <p:spPr>
+          <a:xfrm>
+            <a:off x="1502160" y="6172200"/>
+            <a:ext cx="2374084" cy="369332"/>
+          </a:xfrm>
+          <a:prstGeom prst="rect">
+            <a:avLst/>
+          </a:prstGeom>
+          <a:noFill/>
+        </p:spPr>
+        <p:txBody>
+          <a:bodyPr wrap="square" rtlCol="0">
+            <a:spAutoFit/>
+          </a:bodyPr>
+          <a:lstStyle/>
+          <a:p>
+            <a:pPr algn="ctr"/>
+            <a:r>
+              <a:rPr lang="en-US" dirty="0"/>
+              <a:t>U.S. View</a:t>
+            </a:r>
+          </a:p>
+        </p:txBody>
+      </p:sp>
+      <p:sp>
+        <p:nvSpPr>
+          <p:cNvPr id="5" name="TextBox 4">
+            <a:extLst>
+              <a:ext uri="{FF2B5EF4-FFF2-40B4-BE49-F238E27FC236}">
+                <a16:creationId xmlns:a16="http://schemas.microsoft.com/office/drawing/2014/main" id="{67DF6C24-B2C5-473B-8496-6F6B6F653D60}"/>
+              </a:ext>
+            </a:extLst>
+          </p:cNvPr>
+          <p:cNvSpPr txBox="1"/>
+          <p:nvPr/>
+        </p:nvSpPr>
+        <p:spPr>
+          <a:xfrm>
+            <a:off x="7093231" y="6146086"/>
+            <a:ext cx="2374084" cy="369332"/>
+          </a:xfrm>
+          <a:prstGeom prst="rect">
+            <a:avLst/>
+          </a:prstGeom>
+          <a:noFill/>
+        </p:spPr>
+        <p:txBody>
+          <a:bodyPr wrap="square" rtlCol="0">
+            <a:spAutoFit/>
+          </a:bodyPr>
+          <a:lstStyle/>
+          <a:p>
+            <a:pPr algn="ctr"/>
+            <a:r>
+              <a:rPr lang="en-US" dirty="0"/>
+              <a:t>World View</a:t>
+            </a:r>
+          </a:p>
+        </p:txBody>
+      </p:sp>
     </p:spTree>
     <p:extLst>
       <p:ext uri="{BB962C8B-B14F-4D97-AF65-F5344CB8AC3E}">

</xml_diff>

<commit_message>
Finalized Update 2 & Continued EDA & Data Transformation
</commit_message>
<xml_diff>
--- a/Alec_Schneider_Project 2.pptx
+++ b/Alec_Schneider_Project 2.pptx
@@ -7,9 +7,12 @@
   <p:sldIdLst>
     <p:sldId id="260" r:id="rId2"/>
     <p:sldId id="261" r:id="rId3"/>
-    <p:sldId id="262" r:id="rId4"/>
-    <p:sldId id="264" r:id="rId5"/>
-    <p:sldId id="263" r:id="rId6"/>
+    <p:sldId id="265" r:id="rId4"/>
+    <p:sldId id="266" r:id="rId5"/>
+    <p:sldId id="267" r:id="rId6"/>
+    <p:sldId id="268" r:id="rId7"/>
+    <p:sldId id="264" r:id="rId8"/>
+    <p:sldId id="263" r:id="rId9"/>
   </p:sldIdLst>
   <p:sldSz cx="12192000" cy="6858000"/>
   <p:notesSz cx="6858000" cy="9144000"/>
@@ -3662,7 +3665,7 @@
           </a:xfrm>
         </p:spPr>
         <p:txBody>
-          <a:bodyPr/>
+          <a:bodyPr anchor="ctr"/>
           <a:lstStyle/>
           <a:p>
             <a:r>
@@ -3691,7 +3694,7 @@
         <p:spPr>
           <a:xfrm>
             <a:off x="0" y="1486221"/>
-            <a:ext cx="6369978" cy="5279704"/>
+            <a:ext cx="5720993" cy="5279704"/>
           </a:xfrm>
         </p:spPr>
         <p:txBody>
@@ -3699,7 +3702,7 @@
           <a:lstStyle/>
           <a:p>
             <a:r>
-              <a:rPr lang="en-US" dirty="0"/>
+              <a:rPr lang="en-US" u="sng" dirty="0"/>
               <a:t>Accomplishments This Past Period:</a:t>
             </a:r>
           </a:p>
@@ -3714,6 +3717,13 @@
             <a:pPr lvl="1"/>
             <a:r>
               <a:rPr lang="en-US" dirty="0"/>
+              <a:t>Cleaned up variable names</a:t>
+            </a:r>
+          </a:p>
+          <a:p>
+            <a:pPr lvl="1"/>
+            <a:r>
+              <a:rPr lang="en-US" dirty="0"/>
               <a:t>Explored distributions of variables</a:t>
             </a:r>
           </a:p>
@@ -3728,71 +3738,62 @@
             <a:pPr lvl="1"/>
             <a:r>
               <a:rPr lang="en-US" dirty="0"/>
-              <a:t>Mapped all flight patterns in the data</a:t>
+              <a:t>Mapped all flight patterns in the data using geocode</a:t>
             </a:r>
           </a:p>
           <a:p>
             <a:pPr lvl="1"/>
+            <a:r>
+              <a:rPr lang="en-US" dirty="0"/>
+              <a:t>Created ratios to determine how delayed a flight was or how late it was to arrive</a:t>
+            </a:r>
+          </a:p>
+          <a:p>
+            <a:pPr marL="548640" lvl="2" indent="0">
+              <a:buNone/>
+            </a:pPr>
             <a:endParaRPr lang="en-US" dirty="0"/>
           </a:p>
           <a:p>
+            <a:r>
+              <a:rPr lang="en-US" u="sng" dirty="0"/>
+              <a:t>Next Steps:</a:t>
+            </a:r>
+          </a:p>
+          <a:p>
             <a:pPr lvl="1"/>
             <a:r>
               <a:rPr lang="en-US" dirty="0"/>
-              <a:t>Created </a:t>
-            </a:r>
-            <a:r>
-              <a:rPr lang="en-US" dirty="0">
-                <a:hlinkClick r:id="rId2"/>
-              </a:rPr>
-              <a:t>GitHub repository</a:t>
-            </a:r>
+              <a:t>Create a function to use across multiple R scripts to clean and transform the dataset</a:t>
+            </a:r>
+          </a:p>
+          <a:p>
+            <a:pPr lvl="1"/>
             <a:r>
               <a:rPr lang="en-US" dirty="0"/>
-              <a:t> for version control</a:t>
+              <a:t>Categorize certain numeric variables in order to prep the dataset for modeling</a:t>
             </a:r>
           </a:p>
           <a:p>
             <a:pPr lvl="1"/>
             <a:r>
               <a:rPr lang="en-US" dirty="0"/>
-              <a:t>Created business questions and identified variables that may be used in answering them</a:t>
+              <a:t>Decide on factoring variables</a:t>
             </a:r>
           </a:p>
           <a:p>
             <a:pPr lvl="1"/>
             <a:r>
               <a:rPr lang="en-US" dirty="0"/>
-              <a:t>Began exploratory data analysis</a:t>
-            </a:r>
-          </a:p>
-          <a:p>
-            <a:pPr lvl="2"/>
+              <a:t>Create summary statistics for grouped variables</a:t>
+            </a:r>
+          </a:p>
+          <a:p>
+            <a:pPr lvl="1"/>
             <a:r>
               <a:rPr lang="en-US" dirty="0"/>
-              <a:t>Created a chart of the Satisfaction variable to visualize the distribution of the scores </a:t>
-            </a:r>
-          </a:p>
-          <a:p>
-            <a:pPr lvl="2"/>
-            <a:r>
-              <a:rPr lang="en-US" dirty="0"/>
-              <a:t>Explored NA values in each columns</a:t>
-            </a:r>
-          </a:p>
-          <a:p>
-            <a:pPr lvl="2"/>
-            <a:endParaRPr lang="en-US" dirty="0"/>
-          </a:p>
-          <a:p>
-            <a:r>
-              <a:rPr lang="en-US" dirty="0"/>
-              <a:t>Next Steps:</a:t>
-            </a:r>
-          </a:p>
-          <a:p>
-            <a:pPr lvl="1"/>
-            <a:endParaRPr lang="en-US" dirty="0"/>
+              <a:t>Begin initial linear regression modeling and use of support vector machines </a:t>
+            </a:r>
           </a:p>
         </p:txBody>
       </p:sp>
@@ -4165,7 +4166,7 @@
           </a:lstStyle>
           <a:p>
             <a:r>
-              <a:rPr lang="en-US" dirty="0"/>
+              <a:rPr lang="en-US" u="sng" dirty="0"/>
               <a:t>What’s working well:</a:t>
             </a:r>
           </a:p>
@@ -4180,12 +4181,34 @@
             <a:pPr lvl="1"/>
             <a:r>
               <a:rPr lang="en-US" dirty="0"/>
+              <a:t>Plotting the variables to draw insights on how they are distributed and their relationships with other variables</a:t>
+            </a:r>
+          </a:p>
+          <a:p>
+            <a:pPr lvl="1"/>
+            <a:r>
+              <a:rPr lang="en-US" dirty="0"/>
+              <a:t>Use of </a:t>
+            </a:r>
+            <a:r>
+              <a:rPr lang="en-US" dirty="0" err="1"/>
+              <a:t>tidyverse</a:t>
+            </a:r>
+            <a:r>
+              <a:rPr lang="en-US" dirty="0"/>
+              <a:t> for data grouping, summarization, and filtering is a productivity and code readability boost</a:t>
+            </a:r>
+          </a:p>
+          <a:p>
+            <a:pPr lvl="1"/>
+            <a:r>
+              <a:rPr lang="en-US" dirty="0"/>
               <a:t>Note taking and comments within the code are detailed and informative</a:t>
             </a:r>
           </a:p>
           <a:p>
             <a:r>
-              <a:rPr lang="en-US" dirty="0"/>
+              <a:rPr lang="en-US" u="sng" dirty="0"/>
               <a:t>Issues:</a:t>
             </a:r>
           </a:p>
@@ -4198,10 +4221,95 @@
           </a:p>
           <a:p>
             <a:pPr lvl="1"/>
+            <a:r>
+              <a:rPr lang="en-US" dirty="0"/>
+              <a:t>Categorization of numeric variables	</a:t>
+            </a:r>
+          </a:p>
+          <a:p>
+            <a:pPr lvl="1"/>
             <a:endParaRPr lang="en-US" dirty="0"/>
           </a:p>
         </p:txBody>
       </p:sp>
+      <p:cxnSp>
+        <p:nvCxnSpPr>
+          <p:cNvPr id="7" name="Straight Connector 6">
+            <a:extLst>
+              <a:ext uri="{FF2B5EF4-FFF2-40B4-BE49-F238E27FC236}">
+                <a16:creationId xmlns:a16="http://schemas.microsoft.com/office/drawing/2014/main" id="{415B5B58-F614-4139-97C9-C754C7E85094}"/>
+              </a:ext>
+            </a:extLst>
+          </p:cNvPr>
+          <p:cNvCxnSpPr/>
+          <p:nvPr/>
+        </p:nvCxnSpPr>
+        <p:spPr>
+          <a:xfrm>
+            <a:off x="5612235" y="1249960"/>
+            <a:ext cx="0" cy="5608040"/>
+          </a:xfrm>
+          <a:prstGeom prst="line">
+            <a:avLst/>
+          </a:prstGeom>
+          <a:ln w="57150"/>
+        </p:spPr>
+        <p:style>
+          <a:lnRef idx="1">
+            <a:schemeClr val="accent6"/>
+          </a:lnRef>
+          <a:fillRef idx="0">
+            <a:schemeClr val="accent6"/>
+          </a:fillRef>
+          <a:effectRef idx="0">
+            <a:schemeClr val="accent6"/>
+          </a:effectRef>
+          <a:fontRef idx="minor">
+            <a:schemeClr val="tx1"/>
+          </a:fontRef>
+        </p:style>
+      </p:cxnSp>
+      <p:cxnSp>
+        <p:nvCxnSpPr>
+          <p:cNvPr id="8" name="Straight Connector 7">
+            <a:extLst>
+              <a:ext uri="{FF2B5EF4-FFF2-40B4-BE49-F238E27FC236}">
+                <a16:creationId xmlns:a16="http://schemas.microsoft.com/office/drawing/2014/main" id="{D2DE85B5-5C23-4D55-B3AF-52F953B1F8D2}"/>
+              </a:ext>
+            </a:extLst>
+          </p:cNvPr>
+          <p:cNvCxnSpPr>
+            <a:cxnSpLocks/>
+            <a:stCxn id="5" idx="3"/>
+            <a:endCxn id="3" idx="1"/>
+          </p:cNvCxnSpPr>
+          <p:nvPr/>
+        </p:nvCxnSpPr>
+        <p:spPr>
+          <a:xfrm flipH="1">
+            <a:off x="0" y="4126073"/>
+            <a:ext cx="11292840" cy="0"/>
+          </a:xfrm>
+          <a:prstGeom prst="line">
+            <a:avLst/>
+          </a:prstGeom>
+          <a:ln w="57150"/>
+        </p:spPr>
+        <p:style>
+          <a:lnRef idx="1">
+            <a:schemeClr val="accent6"/>
+          </a:lnRef>
+          <a:fillRef idx="0">
+            <a:schemeClr val="accent6"/>
+          </a:fillRef>
+          <a:effectRef idx="0">
+            <a:schemeClr val="accent6"/>
+          </a:effectRef>
+          <a:fontRef idx="minor">
+            <a:schemeClr val="tx1"/>
+          </a:fontRef>
+        </p:style>
+      </p:cxnSp>
     </p:spTree>
     <p:extLst>
       <p:ext uri="{BB962C8B-B14F-4D97-AF65-F5344CB8AC3E}">
@@ -4234,10 +4342,43 @@
       </p:grpSpPr>
       <p:sp>
         <p:nvSpPr>
+          <p:cNvPr id="2" name="Title 1">
+            <a:extLst>
+              <a:ext uri="{FF2B5EF4-FFF2-40B4-BE49-F238E27FC236}">
+                <a16:creationId xmlns:a16="http://schemas.microsoft.com/office/drawing/2014/main" id="{25E85250-210F-40F5-A5F5-07F6638F3A59}"/>
+              </a:ext>
+            </a:extLst>
+          </p:cNvPr>
+          <p:cNvSpPr>
+            <a:spLocks noGrp="1"/>
+          </p:cNvSpPr>
+          <p:nvPr>
+            <p:ph type="title"/>
+          </p:nvPr>
+        </p:nvSpPr>
+        <p:spPr>
+          <a:xfrm>
+            <a:off x="1261872" y="13422"/>
+            <a:ext cx="9692640" cy="1325562"/>
+          </a:xfrm>
+        </p:spPr>
+        <p:txBody>
+          <a:bodyPr anchor="ctr"/>
+          <a:lstStyle/>
+          <a:p>
+            <a:r>
+              <a:rPr lang="en-US" dirty="0"/>
+              <a:t>Data Processing</a:t>
+            </a:r>
+          </a:p>
+        </p:txBody>
+      </p:sp>
+      <p:sp>
+        <p:nvSpPr>
           <p:cNvPr id="3" name="Content Placeholder 2">
             <a:extLst>
               <a:ext uri="{FF2B5EF4-FFF2-40B4-BE49-F238E27FC236}">
-                <a16:creationId xmlns:a16="http://schemas.microsoft.com/office/drawing/2014/main" id="{75B8851E-C12F-4F9C-B8C5-063A1FFF99DE}"/>
+                <a16:creationId xmlns:a16="http://schemas.microsoft.com/office/drawing/2014/main" id="{7FF3B775-3475-4352-BA15-69B1B81BB896}"/>
               </a:ext>
             </a:extLst>
           </p:cNvPr>
@@ -4250,76 +4391,69 @@
         </p:nvSpPr>
         <p:spPr/>
         <p:txBody>
-          <a:bodyPr>
-            <a:normAutofit fontScale="92500" lnSpcReduction="20000"/>
-          </a:bodyPr>
+          <a:bodyPr/>
           <a:lstStyle/>
           <a:p>
             <a:r>
               <a:rPr lang="en-US" dirty="0"/>
-              <a:t>Which airlines and origin cities have the highest rates of departure delays and cancellations?</a:t>
+              <a:t>NA Values:</a:t>
             </a:r>
           </a:p>
           <a:p>
             <a:pPr lvl="1"/>
             <a:r>
-              <a:rPr lang="en-US" sz="1500" dirty="0"/>
-              <a:t>Variables: Airline Code, Airline Name, Origin City, Flight Cancelled, Departure Delay in Minutes</a:t>
-            </a:r>
-          </a:p>
-          <a:p>
-            <a:r>
               <a:rPr lang="en-US" dirty="0"/>
-              <a:t>Do vacation destinations have a higher satisfaction?</a:t>
+              <a:t>For NAs in the Satisfaction column, the mean satisfaction score was imputed  </a:t>
             </a:r>
           </a:p>
           <a:p>
             <a:pPr lvl="1"/>
             <a:r>
-              <a:rPr lang="en-US" sz="1500" dirty="0"/>
-              <a:t>Variables: Satisfaction, Type of Travel, Destination City</a:t>
-            </a:r>
-          </a:p>
-          <a:p>
-            <a:r>
               <a:rPr lang="en-US" dirty="0"/>
-              <a:t>Which demographics are most price sensitive?</a:t>
+              <a:t>The 337 rows that were not cancelled flights and had NAs, in the Arrival Delay in Minutes and Flight Time in Minutes columns were dropped form the dataset</a:t>
             </a:r>
           </a:p>
           <a:p>
             <a:pPr lvl="1"/>
             <a:r>
-              <a:rPr lang="en-US" sz="1500" dirty="0"/>
-              <a:t>Variables: Age, Gender, Price Sensitivity</a:t>
-            </a:r>
-          </a:p>
-          <a:p>
-            <a:r>
               <a:rPr lang="en-US" dirty="0"/>
-              <a:t>Which airlines have the highest satisfaction scores? Distribution of the scores should be factored in as well.</a:t>
+              <a:t>Left the NAs in for all cancelled flights, will see how this can be leveraged later</a:t>
+            </a:r>
+          </a:p>
+          <a:p>
+            <a:r>
+              <a:rPr lang="en-US" dirty="0"/>
+              <a:t>Create variables for Departure Delay and Arrival Delay as a percent of Flight Time</a:t>
+            </a:r>
+          </a:p>
+          <a:p>
+            <a:r>
+              <a:rPr lang="en-US" dirty="0"/>
+              <a:t>Fixed column names to replace spaces with underscores</a:t>
             </a:r>
           </a:p>
           <a:p>
             <a:pPr lvl="1"/>
             <a:r>
-              <a:rPr lang="en-US" sz="1500" dirty="0"/>
-              <a:t>Variables: Satisfaction, Airline Code, Airline Name</a:t>
-            </a:r>
-          </a:p>
-          <a:p>
-            <a:r>
               <a:rPr lang="en-US" dirty="0"/>
-              <a:t>Which variables affect Satisfaction most?</a:t>
-            </a:r>
+              <a:t>Fixed </a:t>
+            </a:r>
+            <a:r>
+              <a:rPr lang="en-US" dirty="0" err="1"/>
+              <a:t>Orgin_City</a:t>
+            </a:r>
+            <a:r>
+              <a:rPr lang="en-US" dirty="0"/>
+              <a:t> column name to </a:t>
+            </a:r>
+            <a:r>
+              <a:rPr lang="en-US" dirty="0" err="1"/>
+              <a:t>Origin_City</a:t>
+            </a:r>
+            <a:endParaRPr lang="en-US" dirty="0"/>
           </a:p>
           <a:p>
             <a:pPr lvl="1"/>
-            <a:r>
-              <a:rPr lang="en-US" sz="1500" dirty="0"/>
-              <a:t>Variables: Type of Travel, Flight Cancelled, Departure Delay in Minutes, Arrival Delay in Minutes, Flight Time in Minutes, Flight Distance, Arrival Delay Greater 5 Mins, Airline Code, Shopping Amount at Airport, Eating and Drinking at Airport, Class, Airline Status, Age, Gender, Price Sensitivity, No of Flights P.A., % of Flight With Other Airlines, No. of Flight With Other Airlines</a:t>
-            </a:r>
-          </a:p>
-          <a:p>
             <a:endParaRPr lang="en-US" dirty="0"/>
           </a:p>
         </p:txBody>
@@ -4329,7 +4463,7 @@
           <p:cNvPr id="4" name="Slide Number Placeholder 3">
             <a:extLst>
               <a:ext uri="{FF2B5EF4-FFF2-40B4-BE49-F238E27FC236}">
-                <a16:creationId xmlns:a16="http://schemas.microsoft.com/office/drawing/2014/main" id="{20AE4D1F-DB62-4336-B8DD-1480B0E6A2BC}"/>
+                <a16:creationId xmlns:a16="http://schemas.microsoft.com/office/drawing/2014/main" id="{DDA821F4-03FB-4B2E-BF16-ADEF8B63B556}"/>
               </a:ext>
             </a:extLst>
           </p:cNvPr>
@@ -4347,117 +4481,18 @@
           </a:bodyPr>
           <a:lstStyle/>
           <a:p>
-            <a:pPr marL="0" marR="0" lvl="0" indent="0" algn="ctr" defTabSz="457200" rtl="0" eaLnBrk="1" fontAlgn="auto" latinLnBrk="0" hangingPunct="1">
-              <a:lnSpc>
-                <a:spcPct val="100000"/>
-              </a:lnSpc>
-              <a:spcBef>
-                <a:spcPts val="0"/>
-              </a:spcBef>
-              <a:spcAft>
-                <a:spcPts val="0"/>
-              </a:spcAft>
-              <a:buClrTx/>
-              <a:buSzTx/>
-              <a:buFontTx/>
-              <a:buNone/>
-              <a:tabLst/>
-              <a:defRPr/>
-            </a:pPr>
             <a:fld id="{105591DE-F0ED-4EB4-8B26-F5B2659E896E}" type="slidenum">
-              <a:rPr kumimoji="0" lang="en-US" sz="3600" b="0" i="0" u="none" strike="noStrike" kern="1200" cap="none" spc="0" normalizeH="0" baseline="0" noProof="0" smtClean="0">
-                <a:ln>
-                  <a:noFill/>
-                </a:ln>
-                <a:solidFill>
-                  <a:srgbClr val="1F497D">
-                    <a:lumMod val="60000"/>
-                    <a:lumOff val="40000"/>
-                  </a:srgbClr>
-                </a:solidFill>
-                <a:effectLst/>
-                <a:uLnTx/>
-                <a:uFillTx/>
-                <a:latin typeface="Century Schoolbook" panose="02040604050505020304"/>
-                <a:ea typeface="+mn-ea"/>
-                <a:cs typeface="+mn-cs"/>
-              </a:rPr>
-              <a:pPr marL="0" marR="0" lvl="0" indent="0" algn="ctr" defTabSz="457200" rtl="0" eaLnBrk="1" fontAlgn="auto" latinLnBrk="0" hangingPunct="1">
-                <a:lnSpc>
-                  <a:spcPct val="100000"/>
-                </a:lnSpc>
-                <a:spcBef>
-                  <a:spcPts val="0"/>
-                </a:spcBef>
-                <a:spcAft>
-                  <a:spcPts val="0"/>
-                </a:spcAft>
-                <a:buClrTx/>
-                <a:buSzTx/>
-                <a:buFontTx/>
-                <a:buNone/>
-                <a:tabLst/>
-                <a:defRPr/>
-              </a:pPr>
+              <a:rPr lang="en-US" smtClean="0"/>
               <a:t>3</a:t>
             </a:fld>
-            <a:endParaRPr kumimoji="0" lang="en-US" sz="3600" b="0" i="0" u="none" strike="noStrike" kern="1200" cap="none" spc="0" normalizeH="0" baseline="0" noProof="0">
-              <a:ln>
-                <a:noFill/>
-              </a:ln>
-              <a:solidFill>
-                <a:srgbClr val="1F497D">
-                  <a:lumMod val="60000"/>
-                  <a:lumOff val="40000"/>
-                </a:srgbClr>
-              </a:solidFill>
-              <a:effectLst/>
-              <a:uLnTx/>
-              <a:uFillTx/>
-              <a:latin typeface="Century Schoolbook" panose="02040604050505020304"/>
-              <a:ea typeface="+mn-ea"/>
-              <a:cs typeface="+mn-cs"/>
-            </a:endParaRPr>
-          </a:p>
-        </p:txBody>
-      </p:sp>
-      <p:sp>
-        <p:nvSpPr>
-          <p:cNvPr id="7" name="Title 1">
-            <a:extLst>
-              <a:ext uri="{FF2B5EF4-FFF2-40B4-BE49-F238E27FC236}">
-                <a16:creationId xmlns:a16="http://schemas.microsoft.com/office/drawing/2014/main" id="{79B03D66-D68E-46F8-996F-6DFA172CD085}"/>
-              </a:ext>
-            </a:extLst>
-          </p:cNvPr>
-          <p:cNvSpPr>
-            <a:spLocks noGrp="1"/>
-          </p:cNvSpPr>
-          <p:nvPr>
-            <p:ph type="title"/>
-          </p:nvPr>
-        </p:nvSpPr>
-        <p:spPr>
-          <a:xfrm>
-            <a:off x="1249680" y="31117"/>
-            <a:ext cx="9692640" cy="1325562"/>
-          </a:xfrm>
-        </p:spPr>
-        <p:txBody>
-          <a:bodyPr/>
-          <a:lstStyle/>
-          <a:p>
-            <a:r>
-              <a:rPr lang="en-US" dirty="0"/>
-              <a:t>Business Questions</a:t>
-            </a:r>
+            <a:endParaRPr lang="en-US"/>
           </a:p>
         </p:txBody>
       </p:sp>
     </p:spTree>
     <p:extLst>
       <p:ext uri="{BB962C8B-B14F-4D97-AF65-F5344CB8AC3E}">
-        <p14:creationId xmlns:p14="http://schemas.microsoft.com/office/powerpoint/2010/main" val="3392317232"/>
+        <p14:creationId xmlns:p14="http://schemas.microsoft.com/office/powerpoint/2010/main" val="3167577515"/>
       </p:ext>
     </p:extLst>
   </p:cSld>
@@ -4489,7 +4524,7 @@
           <p:cNvPr id="2" name="Title 1">
             <a:extLst>
               <a:ext uri="{FF2B5EF4-FFF2-40B4-BE49-F238E27FC236}">
-                <a16:creationId xmlns:a16="http://schemas.microsoft.com/office/drawing/2014/main" id="{466F94F8-96C3-46B8-9D69-1E52F66051F6}"/>
+                <a16:creationId xmlns:a16="http://schemas.microsoft.com/office/drawing/2014/main" id="{6344EF27-03D8-407C-A39F-DCF3067AB4BE}"/>
               </a:ext>
             </a:extLst>
           </p:cNvPr>
@@ -4500,33 +4535,67 @@
             <p:ph type="title"/>
           </p:nvPr>
         </p:nvSpPr>
+        <p:spPr>
+          <a:xfrm>
+            <a:off x="1261872" y="38589"/>
+            <a:ext cx="9692640" cy="1325562"/>
+          </a:xfrm>
+        </p:spPr>
+        <p:txBody>
+          <a:bodyPr anchor="ctr"/>
+          <a:lstStyle/>
+          <a:p>
+            <a:r>
+              <a:rPr lang="en-US" dirty="0"/>
+              <a:t>Distribution of Variables</a:t>
+            </a:r>
+          </a:p>
+        </p:txBody>
+      </p:sp>
+      <p:sp>
+        <p:nvSpPr>
+          <p:cNvPr id="4" name="Slide Number Placeholder 3">
+            <a:extLst>
+              <a:ext uri="{FF2B5EF4-FFF2-40B4-BE49-F238E27FC236}">
+                <a16:creationId xmlns:a16="http://schemas.microsoft.com/office/drawing/2014/main" id="{A08E4892-8749-4B5A-A7D9-0BAAB09FE29D}"/>
+              </a:ext>
+            </a:extLst>
+          </p:cNvPr>
+          <p:cNvSpPr>
+            <a:spLocks noGrp="1"/>
+          </p:cNvSpPr>
+          <p:nvPr>
+            <p:ph type="sldNum" sz="quarter" idx="12"/>
+          </p:nvPr>
+        </p:nvSpPr>
         <p:spPr/>
         <p:txBody>
-          <a:bodyPr/>
-          <a:lstStyle/>
-          <a:p>
-            <a:r>
-              <a:rPr lang="en-US" dirty="0"/>
-              <a:t>Relationships Between Variables</a:t>
-            </a:r>
+          <a:bodyPr>
+            <a:normAutofit lnSpcReduction="10000"/>
+          </a:bodyPr>
+          <a:lstStyle/>
+          <a:p>
+            <a:fld id="{105591DE-F0ED-4EB4-8B26-F5B2659E896E}" type="slidenum">
+              <a:rPr lang="en-US" smtClean="0"/>
+              <a:t>4</a:t>
+            </a:fld>
+            <a:endParaRPr lang="en-US"/>
           </a:p>
         </p:txBody>
       </p:sp>
       <p:pic>
         <p:nvPicPr>
-          <p:cNvPr id="6" name="Content Placeholder 5" descr="A picture containing graphical user interface&#10;&#10;Description automatically generated">
+          <p:cNvPr id="8" name="Picture 7" descr="Chart, line chart&#10;&#10;Description automatically generated">
             <a:extLst>
               <a:ext uri="{FF2B5EF4-FFF2-40B4-BE49-F238E27FC236}">
-                <a16:creationId xmlns:a16="http://schemas.microsoft.com/office/drawing/2014/main" id="{B423ADDB-24E3-4503-85EA-4AC0D72E3741}"/>
+                <a16:creationId xmlns:a16="http://schemas.microsoft.com/office/drawing/2014/main" id="{BDF2D8D4-C53B-4D53-B2D7-770931FA8122}"/>
               </a:ext>
             </a:extLst>
           </p:cNvPr>
           <p:cNvPicPr>
-            <a:picLocks noGrp="1" noChangeAspect="1"/>
+            <a:picLocks noChangeAspect="1"/>
           </p:cNvPicPr>
-          <p:nvPr>
-            <p:ph idx="1"/>
-          </p:nvPr>
+          <p:nvPr/>
         </p:nvPicPr>
         <p:blipFill>
           <a:blip r:embed="rId2">
@@ -4542,81 +4611,125 @@
         </p:blipFill>
         <p:spPr>
           <a:xfrm>
-            <a:off x="218113" y="1697700"/>
-            <a:ext cx="8212822" cy="5160300"/>
-          </a:xfrm>
-        </p:spPr>
-      </p:pic>
-      <p:sp>
-        <p:nvSpPr>
-          <p:cNvPr id="4" name="Slide Number Placeholder 3">
-            <a:extLst>
-              <a:ext uri="{FF2B5EF4-FFF2-40B4-BE49-F238E27FC236}">
-                <a16:creationId xmlns:a16="http://schemas.microsoft.com/office/drawing/2014/main" id="{A6171F71-BCDD-4C50-9301-6DE9EE391118}"/>
-              </a:ext>
-            </a:extLst>
-          </p:cNvPr>
-          <p:cNvSpPr>
-            <a:spLocks noGrp="1"/>
-          </p:cNvSpPr>
-          <p:nvPr>
-            <p:ph type="sldNum" sz="quarter" idx="12"/>
-          </p:nvPr>
-        </p:nvSpPr>
-        <p:spPr/>
-        <p:txBody>
-          <a:bodyPr>
-            <a:normAutofit lnSpcReduction="10000"/>
-          </a:bodyPr>
-          <a:lstStyle/>
-          <a:p>
-            <a:fld id="{105591DE-F0ED-4EB4-8B26-F5B2659E896E}" type="slidenum">
-              <a:rPr lang="en-US" smtClean="0"/>
-              <a:t>4</a:t>
-            </a:fld>
-            <a:endParaRPr lang="en-US"/>
-          </a:p>
-        </p:txBody>
-      </p:sp>
-      <p:sp>
-        <p:nvSpPr>
-          <p:cNvPr id="7" name="TextBox 6">
-            <a:extLst>
-              <a:ext uri="{FF2B5EF4-FFF2-40B4-BE49-F238E27FC236}">
-                <a16:creationId xmlns:a16="http://schemas.microsoft.com/office/drawing/2014/main" id="{823C0C28-D225-4053-9F14-9109332361CB}"/>
-              </a:ext>
-            </a:extLst>
-          </p:cNvPr>
-          <p:cNvSpPr txBox="1"/>
-          <p:nvPr/>
-        </p:nvSpPr>
-        <p:spPr>
-          <a:xfrm>
-            <a:off x="9018165" y="2139193"/>
-            <a:ext cx="1669409" cy="1246495"/>
+            <a:off x="5476875" y="961694"/>
+            <a:ext cx="5815965" cy="2904335"/>
           </a:xfrm>
           <a:prstGeom prst="rect">
             <a:avLst/>
           </a:prstGeom>
-          <a:noFill/>
         </p:spPr>
-        <p:txBody>
-          <a:bodyPr wrap="square" rtlCol="0">
-            <a:spAutoFit/>
-          </a:bodyPr>
-          <a:lstStyle/>
-          <a:p>
-            <a:r>
-              <a:rPr lang="en-US" sz="1500" dirty="0"/>
-              <a:t>No strong correlations with our y variable, Satisfaction</a:t>
-            </a:r>
-          </a:p>
-        </p:txBody>
-      </p:sp>
+      </p:pic>
+      <p:pic>
+        <p:nvPicPr>
+          <p:cNvPr id="10" name="Picture 9" descr="Chart&#10;&#10;Description automatically generated">
+            <a:extLst>
+              <a:ext uri="{FF2B5EF4-FFF2-40B4-BE49-F238E27FC236}">
+                <a16:creationId xmlns:a16="http://schemas.microsoft.com/office/drawing/2014/main" id="{D410E361-8B29-490C-9EEE-C973CB42062F}"/>
+              </a:ext>
+            </a:extLst>
+          </p:cNvPr>
+          <p:cNvPicPr>
+            <a:picLocks noChangeAspect="1"/>
+          </p:cNvPicPr>
+          <p:nvPr/>
+        </p:nvPicPr>
+        <p:blipFill>
+          <a:blip r:embed="rId3">
+            <a:extLst>
+              <a:ext uri="{28A0092B-C50C-407E-A947-70E740481C1C}">
+                <a14:useLocalDpi xmlns:a14="http://schemas.microsoft.com/office/drawing/2010/main" val="0"/>
+              </a:ext>
+            </a:extLst>
+          </a:blip>
+          <a:stretch>
+            <a:fillRect/>
+          </a:stretch>
+        </p:blipFill>
+        <p:spPr>
+          <a:xfrm>
+            <a:off x="0" y="3834591"/>
+            <a:ext cx="5029200" cy="2984820"/>
+          </a:xfrm>
+          <a:prstGeom prst="rect">
+            <a:avLst/>
+          </a:prstGeom>
+        </p:spPr>
+      </p:pic>
+      <p:pic>
+        <p:nvPicPr>
+          <p:cNvPr id="12" name="Picture 11" descr="Chart&#10;&#10;Description automatically generated">
+            <a:extLst>
+              <a:ext uri="{FF2B5EF4-FFF2-40B4-BE49-F238E27FC236}">
+                <a16:creationId xmlns:a16="http://schemas.microsoft.com/office/drawing/2014/main" id="{10918F6A-4F44-43EA-8379-62A1A315A8A7}"/>
+              </a:ext>
+            </a:extLst>
+          </p:cNvPr>
+          <p:cNvPicPr>
+            <a:picLocks noChangeAspect="1"/>
+          </p:cNvPicPr>
+          <p:nvPr/>
+        </p:nvPicPr>
+        <p:blipFill>
+          <a:blip r:embed="rId4">
+            <a:extLst>
+              <a:ext uri="{28A0092B-C50C-407E-A947-70E740481C1C}">
+                <a14:useLocalDpi xmlns:a14="http://schemas.microsoft.com/office/drawing/2010/main" val="0"/>
+              </a:ext>
+            </a:extLst>
+          </a:blip>
+          <a:stretch>
+            <a:fillRect/>
+          </a:stretch>
+        </p:blipFill>
+        <p:spPr>
+          <a:xfrm>
+            <a:off x="5476874" y="3834591"/>
+            <a:ext cx="5815965" cy="3023409"/>
+          </a:xfrm>
+          <a:prstGeom prst="rect">
+            <a:avLst/>
+          </a:prstGeom>
+        </p:spPr>
+      </p:pic>
+      <p:pic>
+        <p:nvPicPr>
+          <p:cNvPr id="18" name="Content Placeholder 17" descr="Chart, histogram&#10;&#10;Description automatically generated">
+            <a:extLst>
+              <a:ext uri="{FF2B5EF4-FFF2-40B4-BE49-F238E27FC236}">
+                <a16:creationId xmlns:a16="http://schemas.microsoft.com/office/drawing/2014/main" id="{11574014-250C-482C-930D-7BCB29092A7A}"/>
+              </a:ext>
+            </a:extLst>
+          </p:cNvPr>
+          <p:cNvPicPr>
+            <a:picLocks noGrp="1" noChangeAspect="1"/>
+          </p:cNvPicPr>
+          <p:nvPr>
+            <p:ph idx="1"/>
+          </p:nvPr>
+        </p:nvPicPr>
+        <p:blipFill>
+          <a:blip r:embed="rId5">
+            <a:extLst>
+              <a:ext uri="{28A0092B-C50C-407E-A947-70E740481C1C}">
+                <a14:useLocalDpi xmlns:a14="http://schemas.microsoft.com/office/drawing/2010/main" val="0"/>
+              </a:ext>
+            </a:extLst>
+          </a:blip>
+          <a:stretch>
+            <a:fillRect/>
+          </a:stretch>
+        </p:blipFill>
+        <p:spPr>
+          <a:xfrm>
+            <a:off x="1" y="961694"/>
+            <a:ext cx="5029200" cy="2904335"/>
+          </a:xfrm>
+        </p:spPr>
+      </p:pic>
     </p:spTree>
     <p:extLst>
       <p:ext uri="{BB962C8B-B14F-4D97-AF65-F5344CB8AC3E}">
-        <p14:creationId xmlns:p14="http://schemas.microsoft.com/office/powerpoint/2010/main" val="1512996260"/>
+        <p14:creationId xmlns:p14="http://schemas.microsoft.com/office/powerpoint/2010/main" val="3330916793"/>
       </p:ext>
     </p:extLst>
   </p:cSld>
@@ -4648,7 +4761,7 @@
           <p:cNvPr id="2" name="Title 1">
             <a:extLst>
               <a:ext uri="{FF2B5EF4-FFF2-40B4-BE49-F238E27FC236}">
-                <a16:creationId xmlns:a16="http://schemas.microsoft.com/office/drawing/2014/main" id="{958AA016-B08A-48A5-B5BE-7328D153A6DC}"/>
+                <a16:creationId xmlns:a16="http://schemas.microsoft.com/office/drawing/2014/main" id="{6344EF27-03D8-407C-A39F-DCF3067AB4BE}"/>
               </a:ext>
             </a:extLst>
           </p:cNvPr>
@@ -4659,33 +4772,67 @@
             <p:ph type="title"/>
           </p:nvPr>
         </p:nvSpPr>
+        <p:spPr>
+          <a:xfrm>
+            <a:off x="1261872" y="38589"/>
+            <a:ext cx="9692640" cy="1325562"/>
+          </a:xfrm>
+        </p:spPr>
+        <p:txBody>
+          <a:bodyPr anchor="ctr"/>
+          <a:lstStyle/>
+          <a:p>
+            <a:r>
+              <a:rPr lang="en-US" dirty="0"/>
+              <a:t>Distribution of Variables</a:t>
+            </a:r>
+          </a:p>
+        </p:txBody>
+      </p:sp>
+      <p:sp>
+        <p:nvSpPr>
+          <p:cNvPr id="4" name="Slide Number Placeholder 3">
+            <a:extLst>
+              <a:ext uri="{FF2B5EF4-FFF2-40B4-BE49-F238E27FC236}">
+                <a16:creationId xmlns:a16="http://schemas.microsoft.com/office/drawing/2014/main" id="{A08E4892-8749-4B5A-A7D9-0BAAB09FE29D}"/>
+              </a:ext>
+            </a:extLst>
+          </p:cNvPr>
+          <p:cNvSpPr>
+            <a:spLocks noGrp="1"/>
+          </p:cNvSpPr>
+          <p:nvPr>
+            <p:ph type="sldNum" sz="quarter" idx="12"/>
+          </p:nvPr>
+        </p:nvSpPr>
         <p:spPr/>
         <p:txBody>
-          <a:bodyPr/>
-          <a:lstStyle/>
-          <a:p>
-            <a:r>
-              <a:rPr lang="en-US" dirty="0"/>
-              <a:t>Map of Flight Routes</a:t>
-            </a:r>
+          <a:bodyPr>
+            <a:normAutofit lnSpcReduction="10000"/>
+          </a:bodyPr>
+          <a:lstStyle/>
+          <a:p>
+            <a:fld id="{105591DE-F0ED-4EB4-8B26-F5B2659E896E}" type="slidenum">
+              <a:rPr lang="en-US" smtClean="0"/>
+              <a:t>5</a:t>
+            </a:fld>
+            <a:endParaRPr lang="en-US"/>
           </a:p>
         </p:txBody>
       </p:sp>
       <p:pic>
         <p:nvPicPr>
-          <p:cNvPr id="6" name="Content Placeholder 5" descr="A picture containing fireworks, object, dark, person&#10;&#10;Description automatically generated">
+          <p:cNvPr id="9" name="Picture 8" descr="Chart, bar chart&#10;&#10;Description automatically generated">
             <a:extLst>
               <a:ext uri="{FF2B5EF4-FFF2-40B4-BE49-F238E27FC236}">
-                <a16:creationId xmlns:a16="http://schemas.microsoft.com/office/drawing/2014/main" id="{D66E6ECC-310C-4EB4-8D95-03C8AE66F9C6}"/>
+                <a16:creationId xmlns:a16="http://schemas.microsoft.com/office/drawing/2014/main" id="{E31FF431-FBD6-4FE2-B09E-1B5C2A119D3E}"/>
               </a:ext>
             </a:extLst>
           </p:cNvPr>
           <p:cNvPicPr>
-            <a:picLocks noGrp="1" noChangeAspect="1"/>
+            <a:picLocks noChangeAspect="1"/>
           </p:cNvPicPr>
-          <p:nvPr>
-            <p:ph idx="1"/>
-          </p:nvPr>
+          <p:nvPr/>
         </p:nvPicPr>
         <p:blipFill>
           <a:blip r:embed="rId2">
@@ -4701,8 +4848,475 @@
         </p:blipFill>
         <p:spPr>
           <a:xfrm>
-            <a:off x="5267707" y="1777047"/>
-            <a:ext cx="6025133" cy="4351338"/>
+            <a:off x="152603" y="961694"/>
+            <a:ext cx="5143297" cy="2871081"/>
+          </a:xfrm>
+          <a:prstGeom prst="rect">
+            <a:avLst/>
+          </a:prstGeom>
+        </p:spPr>
+      </p:pic>
+      <p:pic>
+        <p:nvPicPr>
+          <p:cNvPr id="15" name="Picture 14" descr="Chart, bar chart&#10;&#10;Description automatically generated">
+            <a:extLst>
+              <a:ext uri="{FF2B5EF4-FFF2-40B4-BE49-F238E27FC236}">
+                <a16:creationId xmlns:a16="http://schemas.microsoft.com/office/drawing/2014/main" id="{B45AA25B-22BB-482F-BFE9-46A99047927E}"/>
+              </a:ext>
+            </a:extLst>
+          </p:cNvPr>
+          <p:cNvPicPr>
+            <a:picLocks noChangeAspect="1"/>
+          </p:cNvPicPr>
+          <p:nvPr/>
+        </p:nvPicPr>
+        <p:blipFill>
+          <a:blip r:embed="rId3">
+            <a:extLst>
+              <a:ext uri="{28A0092B-C50C-407E-A947-70E740481C1C}">
+                <a14:useLocalDpi xmlns:a14="http://schemas.microsoft.com/office/drawing/2010/main" val="0"/>
+              </a:ext>
+            </a:extLst>
+          </a:blip>
+          <a:stretch>
+            <a:fillRect/>
+          </a:stretch>
+        </p:blipFill>
+        <p:spPr>
+          <a:xfrm>
+            <a:off x="5476874" y="961695"/>
+            <a:ext cx="5815965" cy="2877956"/>
+          </a:xfrm>
+          <a:prstGeom prst="rect">
+            <a:avLst/>
+          </a:prstGeom>
+        </p:spPr>
+      </p:pic>
+      <p:pic>
+        <p:nvPicPr>
+          <p:cNvPr id="19" name="Picture 18" descr="Chart, line chart&#10;&#10;Description automatically generated">
+            <a:extLst>
+              <a:ext uri="{FF2B5EF4-FFF2-40B4-BE49-F238E27FC236}">
+                <a16:creationId xmlns:a16="http://schemas.microsoft.com/office/drawing/2014/main" id="{5AF7FA50-91C3-432E-B27E-78D650607812}"/>
+              </a:ext>
+            </a:extLst>
+          </p:cNvPr>
+          <p:cNvPicPr>
+            <a:picLocks noChangeAspect="1"/>
+          </p:cNvPicPr>
+          <p:nvPr/>
+        </p:nvPicPr>
+        <p:blipFill>
+          <a:blip r:embed="rId4">
+            <a:extLst>
+              <a:ext uri="{28A0092B-C50C-407E-A947-70E740481C1C}">
+                <a14:useLocalDpi xmlns:a14="http://schemas.microsoft.com/office/drawing/2010/main" val="0"/>
+              </a:ext>
+            </a:extLst>
+          </a:blip>
+          <a:stretch>
+            <a:fillRect/>
+          </a:stretch>
+        </p:blipFill>
+        <p:spPr>
+          <a:xfrm>
+            <a:off x="152602" y="3843435"/>
+            <a:ext cx="10801910" cy="2922489"/>
+          </a:xfrm>
+          <a:prstGeom prst="rect">
+            <a:avLst/>
+          </a:prstGeom>
+        </p:spPr>
+      </p:pic>
+    </p:spTree>
+    <p:extLst>
+      <p:ext uri="{BB962C8B-B14F-4D97-AF65-F5344CB8AC3E}">
+        <p14:creationId xmlns:p14="http://schemas.microsoft.com/office/powerpoint/2010/main" val="2816526170"/>
+      </p:ext>
+    </p:extLst>
+  </p:cSld>
+  <p:clrMapOvr>
+    <a:masterClrMapping/>
+  </p:clrMapOvr>
+</p:sld>
+</file>
+
+<file path=ppt/slides/slide6.xml><?xml version="1.0" encoding="utf-8"?>
+<p:sld xmlns:a="http://schemas.openxmlformats.org/drawingml/2006/main" xmlns:r="http://schemas.openxmlformats.org/officeDocument/2006/relationships" xmlns:p="http://schemas.openxmlformats.org/presentationml/2006/main">
+  <p:cSld>
+    <p:spTree>
+      <p:nvGrpSpPr>
+        <p:cNvPr id="1" name=""/>
+        <p:cNvGrpSpPr/>
+        <p:nvPr/>
+      </p:nvGrpSpPr>
+      <p:grpSpPr>
+        <a:xfrm>
+          <a:off x="0" y="0"/>
+          <a:ext cx="0" cy="0"/>
+          <a:chOff x="0" y="0"/>
+          <a:chExt cx="0" cy="0"/>
+        </a:xfrm>
+      </p:grpSpPr>
+      <p:sp>
+        <p:nvSpPr>
+          <p:cNvPr id="2" name="Title 1">
+            <a:extLst>
+              <a:ext uri="{FF2B5EF4-FFF2-40B4-BE49-F238E27FC236}">
+                <a16:creationId xmlns:a16="http://schemas.microsoft.com/office/drawing/2014/main" id="{6344EF27-03D8-407C-A39F-DCF3067AB4BE}"/>
+              </a:ext>
+            </a:extLst>
+          </p:cNvPr>
+          <p:cNvSpPr>
+            <a:spLocks noGrp="1"/>
+          </p:cNvSpPr>
+          <p:nvPr>
+            <p:ph type="title"/>
+          </p:nvPr>
+        </p:nvSpPr>
+        <p:spPr>
+          <a:xfrm>
+            <a:off x="1261872" y="38589"/>
+            <a:ext cx="9692640" cy="1325562"/>
+          </a:xfrm>
+        </p:spPr>
+        <p:txBody>
+          <a:bodyPr anchor="ctr"/>
+          <a:lstStyle/>
+          <a:p>
+            <a:r>
+              <a:rPr lang="en-US" dirty="0"/>
+              <a:t>Mean Satisfaction by Airline</a:t>
+            </a:r>
+          </a:p>
+        </p:txBody>
+      </p:sp>
+      <p:sp>
+        <p:nvSpPr>
+          <p:cNvPr id="4" name="Slide Number Placeholder 3">
+            <a:extLst>
+              <a:ext uri="{FF2B5EF4-FFF2-40B4-BE49-F238E27FC236}">
+                <a16:creationId xmlns:a16="http://schemas.microsoft.com/office/drawing/2014/main" id="{A08E4892-8749-4B5A-A7D9-0BAAB09FE29D}"/>
+              </a:ext>
+            </a:extLst>
+          </p:cNvPr>
+          <p:cNvSpPr>
+            <a:spLocks noGrp="1"/>
+          </p:cNvSpPr>
+          <p:nvPr>
+            <p:ph type="sldNum" sz="quarter" idx="12"/>
+          </p:nvPr>
+        </p:nvSpPr>
+        <p:spPr/>
+        <p:txBody>
+          <a:bodyPr>
+            <a:normAutofit lnSpcReduction="10000"/>
+          </a:bodyPr>
+          <a:lstStyle/>
+          <a:p>
+            <a:fld id="{105591DE-F0ED-4EB4-8B26-F5B2659E896E}" type="slidenum">
+              <a:rPr lang="en-US" smtClean="0"/>
+              <a:t>6</a:t>
+            </a:fld>
+            <a:endParaRPr lang="en-US"/>
+          </a:p>
+        </p:txBody>
+      </p:sp>
+      <p:pic>
+        <p:nvPicPr>
+          <p:cNvPr id="10" name="Picture 9" descr="Chart&#10;&#10;Description automatically generated">
+            <a:extLst>
+              <a:ext uri="{FF2B5EF4-FFF2-40B4-BE49-F238E27FC236}">
+                <a16:creationId xmlns:a16="http://schemas.microsoft.com/office/drawing/2014/main" id="{886CC1C3-2512-41FD-9321-D1189F0C3F1F}"/>
+              </a:ext>
+            </a:extLst>
+          </p:cNvPr>
+          <p:cNvPicPr>
+            <a:picLocks noChangeAspect="1"/>
+          </p:cNvPicPr>
+          <p:nvPr/>
+        </p:nvPicPr>
+        <p:blipFill>
+          <a:blip r:embed="rId2">
+            <a:extLst>
+              <a:ext uri="{28A0092B-C50C-407E-A947-70E740481C1C}">
+                <a14:useLocalDpi xmlns:a14="http://schemas.microsoft.com/office/drawing/2010/main" val="0"/>
+              </a:ext>
+            </a:extLst>
+          </a:blip>
+          <a:stretch>
+            <a:fillRect/>
+          </a:stretch>
+        </p:blipFill>
+        <p:spPr>
+          <a:xfrm>
+            <a:off x="697885" y="1005142"/>
+            <a:ext cx="8068609" cy="5852858"/>
+          </a:xfrm>
+          <a:prstGeom prst="rect">
+            <a:avLst/>
+          </a:prstGeom>
+        </p:spPr>
+      </p:pic>
+    </p:spTree>
+    <p:extLst>
+      <p:ext uri="{BB962C8B-B14F-4D97-AF65-F5344CB8AC3E}">
+        <p14:creationId xmlns:p14="http://schemas.microsoft.com/office/powerpoint/2010/main" val="3775076574"/>
+      </p:ext>
+    </p:extLst>
+  </p:cSld>
+  <p:clrMapOvr>
+    <a:masterClrMapping/>
+  </p:clrMapOvr>
+</p:sld>
+</file>
+
+<file path=ppt/slides/slide7.xml><?xml version="1.0" encoding="utf-8"?>
+<p:sld xmlns:a="http://schemas.openxmlformats.org/drawingml/2006/main" xmlns:r="http://schemas.openxmlformats.org/officeDocument/2006/relationships" xmlns:p="http://schemas.openxmlformats.org/presentationml/2006/main">
+  <p:cSld>
+    <p:spTree>
+      <p:nvGrpSpPr>
+        <p:cNvPr id="1" name=""/>
+        <p:cNvGrpSpPr/>
+        <p:nvPr/>
+      </p:nvGrpSpPr>
+      <p:grpSpPr>
+        <a:xfrm>
+          <a:off x="0" y="0"/>
+          <a:ext cx="0" cy="0"/>
+          <a:chOff x="0" y="0"/>
+          <a:chExt cx="0" cy="0"/>
+        </a:xfrm>
+      </p:grpSpPr>
+      <p:sp>
+        <p:nvSpPr>
+          <p:cNvPr id="2" name="Title 1">
+            <a:extLst>
+              <a:ext uri="{FF2B5EF4-FFF2-40B4-BE49-F238E27FC236}">
+                <a16:creationId xmlns:a16="http://schemas.microsoft.com/office/drawing/2014/main" id="{466F94F8-96C3-46B8-9D69-1E52F66051F6}"/>
+              </a:ext>
+            </a:extLst>
+          </p:cNvPr>
+          <p:cNvSpPr>
+            <a:spLocks noGrp="1"/>
+          </p:cNvSpPr>
+          <p:nvPr>
+            <p:ph type="title"/>
+          </p:nvPr>
+        </p:nvSpPr>
+        <p:spPr>
+          <a:xfrm>
+            <a:off x="1261872" y="22860"/>
+            <a:ext cx="9692640" cy="1325562"/>
+          </a:xfrm>
+        </p:spPr>
+        <p:txBody>
+          <a:bodyPr anchor="ctr"/>
+          <a:lstStyle/>
+          <a:p>
+            <a:r>
+              <a:rPr lang="en-US" dirty="0"/>
+              <a:t>Relationships Between Variables</a:t>
+            </a:r>
+          </a:p>
+        </p:txBody>
+      </p:sp>
+      <p:pic>
+        <p:nvPicPr>
+          <p:cNvPr id="6" name="Content Placeholder 5" descr="A picture containing graphical user interface&#10;&#10;Description automatically generated">
+            <a:extLst>
+              <a:ext uri="{FF2B5EF4-FFF2-40B4-BE49-F238E27FC236}">
+                <a16:creationId xmlns:a16="http://schemas.microsoft.com/office/drawing/2014/main" id="{B423ADDB-24E3-4503-85EA-4AC0D72E3741}"/>
+              </a:ext>
+            </a:extLst>
+          </p:cNvPr>
+          <p:cNvPicPr>
+            <a:picLocks noGrp="1" noChangeAspect="1"/>
+          </p:cNvPicPr>
+          <p:nvPr>
+            <p:ph idx="1"/>
+          </p:nvPr>
+        </p:nvPicPr>
+        <p:blipFill>
+          <a:blip r:embed="rId2">
+            <a:extLst>
+              <a:ext uri="{28A0092B-C50C-407E-A947-70E740481C1C}">
+                <a14:useLocalDpi xmlns:a14="http://schemas.microsoft.com/office/drawing/2010/main" val="0"/>
+              </a:ext>
+            </a:extLst>
+          </a:blip>
+          <a:stretch>
+            <a:fillRect/>
+          </a:stretch>
+        </p:blipFill>
+        <p:spPr>
+          <a:xfrm>
+            <a:off x="0" y="1124125"/>
+            <a:ext cx="8430935" cy="5733875"/>
+          </a:xfrm>
+        </p:spPr>
+      </p:pic>
+      <p:sp>
+        <p:nvSpPr>
+          <p:cNvPr id="4" name="Slide Number Placeholder 3">
+            <a:extLst>
+              <a:ext uri="{FF2B5EF4-FFF2-40B4-BE49-F238E27FC236}">
+                <a16:creationId xmlns:a16="http://schemas.microsoft.com/office/drawing/2014/main" id="{A6171F71-BCDD-4C50-9301-6DE9EE391118}"/>
+              </a:ext>
+            </a:extLst>
+          </p:cNvPr>
+          <p:cNvSpPr>
+            <a:spLocks noGrp="1"/>
+          </p:cNvSpPr>
+          <p:nvPr>
+            <p:ph type="sldNum" sz="quarter" idx="12"/>
+          </p:nvPr>
+        </p:nvSpPr>
+        <p:spPr/>
+        <p:txBody>
+          <a:bodyPr>
+            <a:normAutofit lnSpcReduction="10000"/>
+          </a:bodyPr>
+          <a:lstStyle/>
+          <a:p>
+            <a:fld id="{105591DE-F0ED-4EB4-8B26-F5B2659E896E}" type="slidenum">
+              <a:rPr lang="en-US" smtClean="0"/>
+              <a:t>7</a:t>
+            </a:fld>
+            <a:endParaRPr lang="en-US"/>
+          </a:p>
+        </p:txBody>
+      </p:sp>
+      <p:sp>
+        <p:nvSpPr>
+          <p:cNvPr id="7" name="TextBox 6">
+            <a:extLst>
+              <a:ext uri="{FF2B5EF4-FFF2-40B4-BE49-F238E27FC236}">
+                <a16:creationId xmlns:a16="http://schemas.microsoft.com/office/drawing/2014/main" id="{823C0C28-D225-4053-9F14-9109332361CB}"/>
+              </a:ext>
+            </a:extLst>
+          </p:cNvPr>
+          <p:cNvSpPr txBox="1"/>
+          <p:nvPr/>
+        </p:nvSpPr>
+        <p:spPr>
+          <a:xfrm>
+            <a:off x="8724550" y="1510018"/>
+            <a:ext cx="1936347" cy="1015663"/>
+          </a:xfrm>
+          <a:prstGeom prst="rect">
+            <a:avLst/>
+          </a:prstGeom>
+          <a:noFill/>
+        </p:spPr>
+        <p:txBody>
+          <a:bodyPr wrap="square" rtlCol="0">
+            <a:spAutoFit/>
+          </a:bodyPr>
+          <a:lstStyle/>
+          <a:p>
+            <a:r>
+              <a:rPr lang="en-US" sz="1500" dirty="0"/>
+              <a:t>No strong correlations with our y variable, Satisfaction</a:t>
+            </a:r>
+          </a:p>
+        </p:txBody>
+      </p:sp>
+    </p:spTree>
+    <p:extLst>
+      <p:ext uri="{BB962C8B-B14F-4D97-AF65-F5344CB8AC3E}">
+        <p14:creationId xmlns:p14="http://schemas.microsoft.com/office/powerpoint/2010/main" val="1512996260"/>
+      </p:ext>
+    </p:extLst>
+  </p:cSld>
+  <p:clrMapOvr>
+    <a:masterClrMapping/>
+  </p:clrMapOvr>
+</p:sld>
+</file>
+
+<file path=ppt/slides/slide8.xml><?xml version="1.0" encoding="utf-8"?>
+<p:sld xmlns:a="http://schemas.openxmlformats.org/drawingml/2006/main" xmlns:r="http://schemas.openxmlformats.org/officeDocument/2006/relationships" xmlns:p="http://schemas.openxmlformats.org/presentationml/2006/main">
+  <p:cSld>
+    <p:spTree>
+      <p:nvGrpSpPr>
+        <p:cNvPr id="1" name=""/>
+        <p:cNvGrpSpPr/>
+        <p:nvPr/>
+      </p:nvGrpSpPr>
+      <p:grpSpPr>
+        <a:xfrm>
+          <a:off x="0" y="0"/>
+          <a:ext cx="0" cy="0"/>
+          <a:chOff x="0" y="0"/>
+          <a:chExt cx="0" cy="0"/>
+        </a:xfrm>
+      </p:grpSpPr>
+      <p:sp>
+        <p:nvSpPr>
+          <p:cNvPr id="2" name="Title 1">
+            <a:extLst>
+              <a:ext uri="{FF2B5EF4-FFF2-40B4-BE49-F238E27FC236}">
+                <a16:creationId xmlns:a16="http://schemas.microsoft.com/office/drawing/2014/main" id="{958AA016-B08A-48A5-B5BE-7328D153A6DC}"/>
+              </a:ext>
+            </a:extLst>
+          </p:cNvPr>
+          <p:cNvSpPr>
+            <a:spLocks noGrp="1"/>
+          </p:cNvSpPr>
+          <p:nvPr>
+            <p:ph type="title"/>
+          </p:nvPr>
+        </p:nvSpPr>
+        <p:spPr>
+          <a:xfrm>
+            <a:off x="1261872" y="13422"/>
+            <a:ext cx="9692640" cy="1325562"/>
+          </a:xfrm>
+        </p:spPr>
+        <p:txBody>
+          <a:bodyPr anchor="ctr"/>
+          <a:lstStyle/>
+          <a:p>
+            <a:r>
+              <a:rPr lang="en-US" dirty="0"/>
+              <a:t>Map of Flight Routes</a:t>
+            </a:r>
+          </a:p>
+        </p:txBody>
+      </p:sp>
+      <p:pic>
+        <p:nvPicPr>
+          <p:cNvPr id="6" name="Content Placeholder 5" descr="A picture containing fireworks, object, dark, person&#10;&#10;Description automatically generated">
+            <a:extLst>
+              <a:ext uri="{FF2B5EF4-FFF2-40B4-BE49-F238E27FC236}">
+                <a16:creationId xmlns:a16="http://schemas.microsoft.com/office/drawing/2014/main" id="{D66E6ECC-310C-4EB4-8D95-03C8AE66F9C6}"/>
+              </a:ext>
+            </a:extLst>
+          </p:cNvPr>
+          <p:cNvPicPr>
+            <a:picLocks noGrp="1" noChangeAspect="1"/>
+          </p:cNvPicPr>
+          <p:nvPr>
+            <p:ph idx="1"/>
+          </p:nvPr>
+        </p:nvPicPr>
+        <p:blipFill>
+          <a:blip r:embed="rId2">
+            <a:extLst>
+              <a:ext uri="{28A0092B-C50C-407E-A947-70E740481C1C}">
+                <a14:useLocalDpi xmlns:a14="http://schemas.microsoft.com/office/drawing/2010/main" val="0"/>
+              </a:ext>
+            </a:extLst>
+          </a:blip>
+          <a:stretch>
+            <a:fillRect/>
+          </a:stretch>
+        </p:blipFill>
+        <p:spPr>
+          <a:xfrm>
+            <a:off x="5267707" y="1208015"/>
+            <a:ext cx="6025133" cy="4920370"/>
           </a:xfrm>
         </p:spPr>
       </p:pic>
@@ -4731,7 +5345,7 @@
           <a:p>
             <a:fld id="{105591DE-F0ED-4EB4-8B26-F5B2659E896E}" type="slidenum">
               <a:rPr lang="en-US" smtClean="0"/>
-              <a:t>5</a:t>
+              <a:t>8</a:t>
             </a:fld>
             <a:endParaRPr lang="en-US"/>
           </a:p>
@@ -4764,8 +5378,8 @@
         </p:blipFill>
         <p:spPr>
           <a:xfrm>
-            <a:off x="177372" y="1777047"/>
-            <a:ext cx="5023660" cy="4239737"/>
+            <a:off x="177372" y="1266739"/>
+            <a:ext cx="5023660" cy="4750046"/>
           </a:xfrm>
           <a:prstGeom prst="rect">
             <a:avLst/>
@@ -4803,7 +5417,7 @@
             <a:pPr algn="ctr"/>
             <a:r>
               <a:rPr lang="en-US" dirty="0"/>
-              <a:t>U.S. View</a:t>
+              <a:t>North America View</a:t>
             </a:r>
           </a:p>
         </p:txBody>

</xml_diff>